<commit_message>
Add comments to slides
</commit_message>
<xml_diff>
--- a/slides.pptx
+++ b/slides.pptx
@@ -243,7 +243,7 @@
           <a:p>
             <a:fld id="{8BDDE874-3A55-4A42-BDC0-7B03FB776E3F}" type="datetimeFigureOut">
               <a:rPr lang="de-DE" smtClean="0"/>
-              <a:t>24.04.2022</a:t>
+              <a:t>25.04.2022</a:t>
             </a:fld>
             <a:endParaRPr lang="de-DE"/>
           </a:p>
@@ -821,6 +821,79 @@
             <a:endParaRPr lang="en-US" dirty="0"/>
           </a:p>
           <a:p>
+            <a:endParaRPr lang="en-US" dirty="0"/>
+          </a:p>
+          <a:p>
+            <a:endParaRPr lang="en-US" dirty="0"/>
+          </a:p>
+          <a:p>
+            <a:pPr marL="0" marR="0" lvl="0" indent="0" algn="l" defTabSz="914400" rtl="0" eaLnBrk="1" fontAlgn="auto" latinLnBrk="0" hangingPunct="1">
+              <a:lnSpc>
+                <a:spcPct val="100000"/>
+              </a:lnSpc>
+              <a:spcBef>
+                <a:spcPts val="0"/>
+              </a:spcBef>
+              <a:spcAft>
+                <a:spcPts val="0"/>
+              </a:spcAft>
+              <a:buClrTx/>
+              <a:buSzTx/>
+              <a:buFontTx/>
+              <a:buNone/>
+              <a:tabLst/>
+              <a:defRPr/>
+            </a:pPr>
+            <a:r>
+              <a:rPr lang="en-US" dirty="0" err="1"/>
+              <a:t>ArticleNumber</a:t>
+            </a:r>
+            <a:r>
+              <a:rPr lang="en-US" dirty="0"/>
+              <a:t> binding:</a:t>
+            </a:r>
+          </a:p>
+          <a:p>
+            <a:pPr marL="0" marR="0" lvl="0" indent="0" algn="l" defTabSz="914400" rtl="0" eaLnBrk="1" fontAlgn="auto" latinLnBrk="0" hangingPunct="1">
+              <a:lnSpc>
+                <a:spcPct val="100000"/>
+              </a:lnSpc>
+              <a:spcBef>
+                <a:spcPts val="0"/>
+              </a:spcBef>
+              <a:spcAft>
+                <a:spcPts val="0"/>
+              </a:spcAft>
+              <a:buClrTx/>
+              <a:buSzTx/>
+              <a:buFontTx/>
+              <a:buNone/>
+              <a:tabLst/>
+              <a:defRPr/>
+            </a:pPr>
+            <a:r>
+              <a:rPr lang="en-US" i="0" dirty="0"/>
+              <a:t>https://localhost:7248/binding/articleNumber/modelBindingProvider/123456789</a:t>
+            </a:r>
+          </a:p>
+          <a:p>
+            <a:pPr marL="0" marR="0" lvl="0" indent="0" algn="l" defTabSz="914400" rtl="0" eaLnBrk="1" fontAlgn="auto" latinLnBrk="0" hangingPunct="1">
+              <a:lnSpc>
+                <a:spcPct val="100000"/>
+              </a:lnSpc>
+              <a:spcBef>
+                <a:spcPts val="0"/>
+              </a:spcBef>
+              <a:spcAft>
+                <a:spcPts val="0"/>
+              </a:spcAft>
+              <a:buClrTx/>
+              <a:buSzTx/>
+              <a:buFontTx/>
+              <a:buNone/>
+              <a:tabLst/>
+              <a:defRPr/>
+            </a:pPr>
             <a:endParaRPr lang="en-AT" dirty="0"/>
           </a:p>
         </p:txBody>
@@ -1051,6 +1124,49 @@
             <a:endParaRPr lang="en-US" dirty="0"/>
           </a:p>
           <a:p>
+            <a:pPr marL="0" marR="0" lvl="0" indent="0" algn="l" defTabSz="914400" rtl="0" eaLnBrk="1" fontAlgn="auto" latinLnBrk="0" hangingPunct="1">
+              <a:lnSpc>
+                <a:spcPct val="100000"/>
+              </a:lnSpc>
+              <a:spcBef>
+                <a:spcPts val="0"/>
+              </a:spcBef>
+              <a:spcAft>
+                <a:spcPts val="0"/>
+              </a:spcAft>
+              <a:buClrTx/>
+              <a:buSzTx/>
+              <a:buFontTx/>
+              <a:buNone/>
+              <a:tabLst/>
+              <a:defRPr/>
+            </a:pPr>
+            <a:r>
+              <a:rPr lang="en-US" dirty="0" err="1"/>
+              <a:t>ArticleNumber</a:t>
+            </a:r>
+            <a:r>
+              <a:rPr lang="en-US" dirty="0"/>
+              <a:t> </a:t>
+            </a:r>
+            <a:r>
+              <a:rPr lang="en-US" dirty="0" err="1"/>
+              <a:t>zentrales</a:t>
+            </a:r>
+            <a:r>
+              <a:rPr lang="en-US" dirty="0"/>
+              <a:t> </a:t>
+            </a:r>
+            <a:r>
+              <a:rPr lang="en-US" dirty="0" err="1"/>
+              <a:t>objekt</a:t>
+            </a:r>
+            <a:endParaRPr lang="en-US" dirty="0"/>
+          </a:p>
+          <a:p>
+            <a:endParaRPr lang="en-US" dirty="0"/>
+          </a:p>
+          <a:p>
             <a:r>
               <a:rPr lang="en-US" dirty="0"/>
               <a:t>HTTP Requests </a:t>
@@ -1082,32 +1198,6 @@
             <a:r>
               <a:rPr lang="en-US" dirty="0" err="1"/>
               <a:t>unterscheiden</a:t>
-            </a:r>
-            <a:endParaRPr lang="en-US" dirty="0"/>
-          </a:p>
-          <a:p>
-            <a:endParaRPr lang="en-US" dirty="0"/>
-          </a:p>
-          <a:p>
-            <a:r>
-              <a:rPr lang="en-US" dirty="0" err="1"/>
-              <a:t>ArticleNumber</a:t>
-            </a:r>
-            <a:r>
-              <a:rPr lang="en-US" dirty="0"/>
-              <a:t> </a:t>
-            </a:r>
-            <a:r>
-              <a:rPr lang="en-US" dirty="0" err="1"/>
-              <a:t>zentrales</a:t>
-            </a:r>
-            <a:r>
-              <a:rPr lang="en-US" dirty="0"/>
-              <a:t> </a:t>
-            </a:r>
-            <a:r>
-              <a:rPr lang="en-US" dirty="0" err="1"/>
-              <a:t>objekt</a:t>
             </a:r>
             <a:endParaRPr lang="en-US" dirty="0"/>
           </a:p>
@@ -1278,6 +1368,90 @@
 </p:notes>
 </file>
 
+<file path=ppt/notesSlides/notesSlide15.xml><?xml version="1.0" encoding="utf-8"?>
+<p:notes xmlns:a="http://schemas.openxmlformats.org/drawingml/2006/main" xmlns:r="http://schemas.openxmlformats.org/officeDocument/2006/relationships" xmlns:p="http://schemas.openxmlformats.org/presentationml/2006/main">
+  <p:cSld>
+    <p:spTree>
+      <p:nvGrpSpPr>
+        <p:cNvPr id="1" name=""/>
+        <p:cNvGrpSpPr/>
+        <p:nvPr/>
+      </p:nvGrpSpPr>
+      <p:grpSpPr>
+        <a:xfrm>
+          <a:off x="0" y="0"/>
+          <a:ext cx="0" cy="0"/>
+          <a:chOff x="0" y="0"/>
+          <a:chExt cx="0" cy="0"/>
+        </a:xfrm>
+      </p:grpSpPr>
+      <p:sp>
+        <p:nvSpPr>
+          <p:cNvPr id="2" name="Folienbildplatzhalter 1"/>
+          <p:cNvSpPr>
+            <a:spLocks noGrp="1" noRot="1" noChangeAspect="1"/>
+          </p:cNvSpPr>
+          <p:nvPr>
+            <p:ph type="sldImg"/>
+          </p:nvPr>
+        </p:nvSpPr>
+        <p:spPr/>
+      </p:sp>
+      <p:sp>
+        <p:nvSpPr>
+          <p:cNvPr id="3" name="Notizenplatzhalter 2"/>
+          <p:cNvSpPr>
+            <a:spLocks noGrp="1"/>
+          </p:cNvSpPr>
+          <p:nvPr>
+            <p:ph type="body" idx="1"/>
+          </p:nvPr>
+        </p:nvSpPr>
+        <p:spPr/>
+        <p:txBody>
+          <a:bodyPr/>
+          <a:lstStyle/>
+          <a:p>
+            <a:endParaRPr lang="en-AT" dirty="0"/>
+          </a:p>
+        </p:txBody>
+      </p:sp>
+      <p:sp>
+        <p:nvSpPr>
+          <p:cNvPr id="4" name="Foliennummernplatzhalter 3"/>
+          <p:cNvSpPr>
+            <a:spLocks noGrp="1"/>
+          </p:cNvSpPr>
+          <p:nvPr>
+            <p:ph type="sldNum" sz="quarter" idx="5"/>
+          </p:nvPr>
+        </p:nvSpPr>
+        <p:spPr/>
+        <p:txBody>
+          <a:bodyPr/>
+          <a:lstStyle/>
+          <a:p>
+            <a:fld id="{4D6B7403-AAEE-4E5A-8745-677A04A5E937}" type="slidenum">
+              <a:rPr lang="de-DE" smtClean="0"/>
+              <a:t>16</a:t>
+            </a:fld>
+            <a:endParaRPr lang="de-DE"/>
+          </a:p>
+        </p:txBody>
+      </p:sp>
+    </p:spTree>
+    <p:extLst>
+      <p:ext uri="{BB962C8B-B14F-4D97-AF65-F5344CB8AC3E}">
+        <p14:creationId xmlns:p14="http://schemas.microsoft.com/office/powerpoint/2010/main" val="1863308535"/>
+      </p:ext>
+    </p:extLst>
+  </p:cSld>
+  <p:clrMapOvr>
+    <a:masterClrMapping/>
+  </p:clrMapOvr>
+</p:notes>
+</file>
+
 <file path=ppt/notesSlides/notesSlide2.xml><?xml version="1.0" encoding="utf-8"?>
 <p:notes xmlns:a="http://schemas.openxmlformats.org/drawingml/2006/main" xmlns:r="http://schemas.openxmlformats.org/officeDocument/2006/relationships" xmlns:p="http://schemas.openxmlformats.org/presentationml/2006/main">
   <p:cSld>
@@ -1336,6 +1510,25 @@
             </a:r>
           </a:p>
           <a:p>
+            <a:endParaRPr lang="en-US" dirty="0"/>
+          </a:p>
+          <a:p>
+            <a:r>
+              <a:rPr lang="en-US" dirty="0"/>
+              <a:t>Bei Fragen </a:t>
+            </a:r>
+            <a:r>
+              <a:rPr lang="en-US" dirty="0" err="1"/>
+              <a:t>einfach</a:t>
+            </a:r>
+            <a:r>
+              <a:rPr lang="en-US" dirty="0"/>
+              <a:t> </a:t>
+            </a:r>
+            <a:r>
+              <a:rPr lang="en-US" dirty="0" err="1"/>
+              <a:t>unterbrechen</a:t>
+            </a:r>
             <a:endParaRPr lang="en-AT" dirty="0"/>
           </a:p>
         </p:txBody>
@@ -1475,7 +1668,7 @@
             </a:r>
             <a:r>
               <a:rPr lang="en-US" dirty="0" err="1"/>
-              <a:t>Verschiedene</a:t>
+              <a:t>verschiedene</a:t>
             </a:r>
             <a:r>
               <a:rPr lang="en-US" dirty="0"/>
@@ -1618,6 +1811,32 @@
           <a:p>
             <a:r>
               <a:rPr lang="en-US" dirty="0" err="1"/>
+              <a:t>Kommt</a:t>
+            </a:r>
+            <a:r>
+              <a:rPr lang="en-US" dirty="0"/>
+              <a:t> </a:t>
+            </a:r>
+            <a:r>
+              <a:rPr lang="en-US" dirty="0" err="1"/>
+              <a:t>aus</a:t>
+            </a:r>
+            <a:r>
+              <a:rPr lang="en-US" dirty="0"/>
+              <a:t> dem DDD-</a:t>
+            </a:r>
+            <a:r>
+              <a:rPr lang="en-US" dirty="0" err="1"/>
+              <a:t>Umfeld</a:t>
+            </a:r>
+            <a:endParaRPr lang="en-US" dirty="0"/>
+          </a:p>
+          <a:p>
+            <a:endParaRPr lang="en-US" dirty="0"/>
+          </a:p>
+          <a:p>
+            <a:r>
+              <a:rPr lang="en-US" dirty="0" err="1"/>
               <a:t>Netto</a:t>
             </a:r>
             <a:r>
@@ -1688,43 +1907,7 @@
               <a:rPr lang="en-US" dirty="0">
                 <a:sym typeface="Wingdings" panose="05000000000000000000" pitchFamily="2" charset="2"/>
               </a:rPr>
-              <a:t>Wenn </a:t>
-            </a:r>
-            <a:r>
-              <a:rPr lang="en-US" dirty="0" err="1">
-                <a:sym typeface="Wingdings" panose="05000000000000000000" pitchFamily="2" charset="2"/>
-              </a:rPr>
-              <a:t>nur</a:t>
-            </a:r>
-            <a:r>
-              <a:rPr lang="en-US" dirty="0">
-                <a:sym typeface="Wingdings" panose="05000000000000000000" pitchFamily="2" charset="2"/>
-              </a:rPr>
-              <a:t> decimal </a:t>
-            </a:r>
-            <a:r>
-              <a:rPr lang="en-US" dirty="0" err="1">
-                <a:sym typeface="Wingdings" panose="05000000000000000000" pitchFamily="2" charset="2"/>
-              </a:rPr>
-              <a:t>verwendet</a:t>
-            </a:r>
-            <a:r>
-              <a:rPr lang="en-US" dirty="0">
-                <a:sym typeface="Wingdings" panose="05000000000000000000" pitchFamily="2" charset="2"/>
-              </a:rPr>
-              <a:t> wird, </a:t>
-            </a:r>
-            <a:r>
-              <a:rPr lang="en-US" dirty="0" err="1">
-                <a:sym typeface="Wingdings" panose="05000000000000000000" pitchFamily="2" charset="2"/>
-              </a:rPr>
-              <a:t>ist</a:t>
-            </a:r>
-            <a:r>
-              <a:rPr lang="en-US" dirty="0">
-                <a:sym typeface="Wingdings" panose="05000000000000000000" pitchFamily="2" charset="2"/>
-              </a:rPr>
-              <a:t> </a:t>
+              <a:t>Nur decimal  </a:t>
             </a:r>
             <a:r>
               <a:rPr lang="en-US" dirty="0" err="1">
@@ -1830,6 +2013,57 @@
             </a:endParaRPr>
           </a:p>
           <a:p>
+            <a:pPr marL="0" indent="0">
+              <a:buFont typeface="Arial" panose="020B0604020202020204" pitchFamily="34" charset="0"/>
+              <a:buNone/>
+            </a:pPr>
+            <a:r>
+              <a:rPr lang="en-US" dirty="0" err="1">
+                <a:sym typeface="Wingdings" panose="05000000000000000000" pitchFamily="2" charset="2"/>
+              </a:rPr>
+              <a:t>Beim</a:t>
+            </a:r>
+            <a:r>
+              <a:rPr lang="en-US" dirty="0">
+                <a:sym typeface="Wingdings" panose="05000000000000000000" pitchFamily="2" charset="2"/>
+              </a:rPr>
+              <a:t> erstellen wird </a:t>
+            </a:r>
+            <a:r>
+              <a:rPr lang="en-US" dirty="0" err="1">
+                <a:sym typeface="Wingdings" panose="05000000000000000000" pitchFamily="2" charset="2"/>
+              </a:rPr>
+              <a:t>geprüft</a:t>
+            </a:r>
+            <a:r>
+              <a:rPr lang="en-US" dirty="0">
+                <a:sym typeface="Wingdings" panose="05000000000000000000" pitchFamily="2" charset="2"/>
+              </a:rPr>
+              <a:t> </a:t>
+            </a:r>
+            <a:r>
+              <a:rPr lang="en-US" dirty="0" err="1">
+                <a:sym typeface="Wingdings" panose="05000000000000000000" pitchFamily="2" charset="2"/>
+              </a:rPr>
+              <a:t>ob</a:t>
+            </a:r>
+            <a:r>
+              <a:rPr lang="en-US" dirty="0">
+                <a:sym typeface="Wingdings" panose="05000000000000000000" pitchFamily="2" charset="2"/>
+              </a:rPr>
+              <a:t> </a:t>
+            </a:r>
+            <a:r>
+              <a:rPr lang="en-US" dirty="0" err="1">
+                <a:sym typeface="Wingdings" panose="05000000000000000000" pitchFamily="2" charset="2"/>
+              </a:rPr>
+              <a:t>valide</a:t>
+            </a:r>
+            <a:endParaRPr lang="en-US" dirty="0">
+              <a:sym typeface="Wingdings" panose="05000000000000000000" pitchFamily="2" charset="2"/>
+            </a:endParaRPr>
+          </a:p>
+          <a:p>
             <a:pPr marL="171450" indent="-171450">
               <a:buFont typeface="Arial" panose="020B0604020202020204" pitchFamily="34" charset="0"/>
               <a:buChar char="•"/>
@@ -1864,6 +2098,57 @@
               </a:rPr>
               <a:t>Ziffern</a:t>
             </a:r>
+            <a:endParaRPr lang="en-US" dirty="0">
+              <a:sym typeface="Wingdings" panose="05000000000000000000" pitchFamily="2" charset="2"/>
+            </a:endParaRPr>
+          </a:p>
+          <a:p>
+            <a:pPr marL="171450" indent="-171450">
+              <a:buFont typeface="Arial" panose="020B0604020202020204" pitchFamily="34" charset="0"/>
+              <a:buChar char="•"/>
+            </a:pPr>
+            <a:endParaRPr lang="en-US" dirty="0">
+              <a:sym typeface="Wingdings" panose="05000000000000000000" pitchFamily="2" charset="2"/>
+            </a:endParaRPr>
+          </a:p>
+          <a:p>
+            <a:pPr marL="0" indent="0">
+              <a:buFont typeface="Arial" panose="020B0604020202020204" pitchFamily="34" charset="0"/>
+              <a:buNone/>
+            </a:pPr>
+            <a:r>
+              <a:rPr lang="en-US" dirty="0">
+                <a:sym typeface="Wingdings" panose="05000000000000000000" pitchFamily="2" charset="2"/>
+              </a:rPr>
+              <a:t>Record </a:t>
+            </a:r>
+            <a:r>
+              <a:rPr lang="en-US" dirty="0" err="1">
+                <a:sym typeface="Wingdings" panose="05000000000000000000" pitchFamily="2" charset="2"/>
+              </a:rPr>
+              <a:t>verwendet</a:t>
+            </a:r>
+            <a:r>
+              <a:rPr lang="en-US" dirty="0">
+                <a:sym typeface="Wingdings" panose="05000000000000000000" pitchFamily="2" charset="2"/>
+              </a:rPr>
+              <a:t>  generierte automatisch Equals-</a:t>
+            </a:r>
+            <a:r>
+              <a:rPr lang="en-US" dirty="0" err="1">
+                <a:sym typeface="Wingdings" panose="05000000000000000000" pitchFamily="2" charset="2"/>
+              </a:rPr>
+              <a:t>Methode</a:t>
+            </a:r>
+            <a:endParaRPr lang="en-US" dirty="0">
+              <a:sym typeface="Wingdings" panose="05000000000000000000" pitchFamily="2" charset="2"/>
+            </a:endParaRPr>
+          </a:p>
+          <a:p>
+            <a:pPr marL="171450" indent="-171450">
+              <a:buFont typeface="Arial" panose="020B0604020202020204" pitchFamily="34" charset="0"/>
+              <a:buChar char="•"/>
+            </a:pPr>
             <a:endParaRPr lang="en-US" dirty="0">
               <a:sym typeface="Wingdings" panose="05000000000000000000" pitchFamily="2" charset="2"/>
             </a:endParaRPr>
@@ -1985,9 +2270,44 @@
               <a:rPr lang="en-US" dirty="0" err="1"/>
               <a:t>leichtgewichtig</a:t>
             </a:r>
-            <a:endParaRPr lang="en-US" dirty="0"/>
-          </a:p>
-          <a:p>
+            <a:r>
+              <a:rPr lang="en-US" dirty="0"/>
+              <a:t> (</a:t>
+            </a:r>
+            <a:r>
+              <a:rPr lang="en-US" dirty="0" err="1"/>
+              <a:t>im</a:t>
+            </a:r>
+            <a:r>
+              <a:rPr lang="en-US" dirty="0"/>
+              <a:t> </a:t>
+            </a:r>
+            <a:r>
+              <a:rPr lang="en-US" dirty="0" err="1"/>
+              <a:t>Vergleich</a:t>
+            </a:r>
+            <a:r>
+              <a:rPr lang="en-US" dirty="0"/>
+              <a:t> </a:t>
+            </a:r>
+            <a:r>
+              <a:rPr lang="en-US" dirty="0" err="1"/>
+              <a:t>zu</a:t>
+            </a:r>
+            <a:r>
+              <a:rPr lang="en-US" dirty="0"/>
+              <a:t> .NET Framework)</a:t>
+            </a:r>
+          </a:p>
+          <a:p>
+            <a:r>
+              <a:rPr lang="en-US" dirty="0" err="1"/>
+              <a:t>Gutes</a:t>
+            </a:r>
+            <a:r>
+              <a:rPr lang="en-US" dirty="0"/>
+              <a:t> Tooling</a:t>
+            </a:r>
             <a:endParaRPr lang="en-AT" dirty="0"/>
           </a:p>
         </p:txBody>
@@ -2073,13 +2393,38 @@
           <a:lstStyle/>
           <a:p>
             <a:r>
+              <a:rPr lang="en-US" dirty="0"/>
+              <a:t>Parameter </a:t>
+            </a:r>
+            <a:r>
               <a:rPr lang="en-US" dirty="0" err="1"/>
-              <a:t>Über</a:t>
+              <a:t>binden</a:t>
             </a:r>
             <a:r>
               <a:rPr lang="en-US" dirty="0"/>
-              <a:t> Route und Query Parameter</a:t>
-            </a:r>
+              <a:t> </a:t>
+            </a:r>
+            <a:r>
+              <a:rPr lang="en-US" dirty="0" err="1"/>
+              <a:t>über</a:t>
+            </a:r>
+            <a:r>
+              <a:rPr lang="en-US" dirty="0"/>
+              <a:t> Route und Query-String </a:t>
+            </a:r>
+            <a:r>
+              <a:rPr lang="en-US" dirty="0">
+                <a:sym typeface="Wingdings" panose="05000000000000000000" pitchFamily="2" charset="2"/>
+              </a:rPr>
+              <a:t> </a:t>
+            </a:r>
+            <a:r>
+              <a:rPr lang="en-US" dirty="0" err="1">
+                <a:sym typeface="Wingdings" panose="05000000000000000000" pitchFamily="2" charset="2"/>
+              </a:rPr>
+              <a:t>Validierung</a:t>
+            </a:r>
+            <a:endParaRPr lang="en-US" dirty="0"/>
           </a:p>
           <a:p>
             <a:r>
@@ -2165,6 +2510,68 @@
               </a:rPr>
               <a:t>mitgegeben</a:t>
             </a:r>
+            <a:endParaRPr lang="en-US" dirty="0">
+              <a:sym typeface="Wingdings" panose="05000000000000000000" pitchFamily="2" charset="2"/>
+            </a:endParaRPr>
+          </a:p>
+          <a:p>
+            <a:endParaRPr lang="en-US" dirty="0">
+              <a:sym typeface="Wingdings" panose="05000000000000000000" pitchFamily="2" charset="2"/>
+            </a:endParaRPr>
+          </a:p>
+          <a:p>
+            <a:r>
+              <a:rPr lang="en-US" dirty="0">
+                <a:sym typeface="Wingdings" panose="05000000000000000000" pitchFamily="2" charset="2"/>
+              </a:rPr>
+              <a:t>Int binding:</a:t>
+            </a:r>
+          </a:p>
+          <a:p>
+            <a:r>
+              <a:rPr lang="en-US" dirty="0">
+                <a:sym typeface="Wingdings" panose="05000000000000000000" pitchFamily="2" charset="2"/>
+              </a:rPr>
+              <a:t>https://localhost:7248/binding/int/42</a:t>
+            </a:r>
+          </a:p>
+          <a:p>
+            <a:endParaRPr lang="en-US" dirty="0">
+              <a:sym typeface="Wingdings" panose="05000000000000000000" pitchFamily="2" charset="2"/>
+            </a:endParaRPr>
+          </a:p>
+          <a:p>
+            <a:r>
+              <a:rPr lang="en-US" dirty="0">
+                <a:sym typeface="Wingdings" panose="05000000000000000000" pitchFamily="2" charset="2"/>
+              </a:rPr>
+              <a:t>String binding:</a:t>
+            </a:r>
+          </a:p>
+          <a:p>
+            <a:pPr marL="0" marR="0" lvl="0" indent="0" algn="l" defTabSz="914400" rtl="0" eaLnBrk="1" fontAlgn="auto" latinLnBrk="0" hangingPunct="1">
+              <a:lnSpc>
+                <a:spcPct val="100000"/>
+              </a:lnSpc>
+              <a:spcBef>
+                <a:spcPts val="0"/>
+              </a:spcBef>
+              <a:spcAft>
+                <a:spcPts val="0"/>
+              </a:spcAft>
+              <a:buClrTx/>
+              <a:buSzTx/>
+              <a:buFontTx/>
+              <a:buNone/>
+              <a:tabLst/>
+              <a:defRPr/>
+            </a:pPr>
+            <a:r>
+              <a:rPr lang="en-US" i="0" dirty="0"/>
+              <a:t>https://localhost:7248/binding/articleNumber/string/123456789</a:t>
+            </a:r>
+          </a:p>
+          <a:p>
             <a:endParaRPr lang="en-US" dirty="0">
               <a:sym typeface="Wingdings" panose="05000000000000000000" pitchFamily="2" charset="2"/>
             </a:endParaRPr>
@@ -2450,7 +2857,7 @@
               <a:tabLst/>
               <a:defRPr/>
             </a:pPr>
-            <a:endParaRPr lang="en-US" i="0"/>
+            <a:endParaRPr lang="en-US" i="0" dirty="0"/>
           </a:p>
           <a:p>
             <a:pPr marL="0" marR="0" lvl="0" indent="0" algn="l" defTabSz="914400" rtl="0" eaLnBrk="1" fontAlgn="auto" latinLnBrk="0" hangingPunct="1">
@@ -2471,26 +2878,107 @@
               <a:defRPr/>
             </a:pPr>
             <a:r>
-              <a:rPr lang="en-US" i="0"/>
-              <a:t>Sample </a:t>
+              <a:rPr lang="en-US" i="0" dirty="0" err="1"/>
+              <a:t>Guid</a:t>
             </a:r>
             <a:r>
               <a:rPr lang="en-US" i="0" dirty="0"/>
-              <a:t>GUID: </a:t>
-            </a:r>
-            <a:r>
-              <a:rPr lang="en-US" i="0" dirty="0">
-                <a:solidFill>
-                  <a:srgbClr val="248700"/>
-                </a:solidFill>
-                <a:effectLst/>
-              </a:rPr>
-              <a:t>AAAAAAAA-D7B4-47ED-A9E7-AE18721D6F3D</a:t>
-            </a:r>
-            <a:endParaRPr lang="en-AT" i="0" dirty="0"/>
-          </a:p>
-          <a:p>
-            <a:endParaRPr lang="en-AT" dirty="0"/>
+              <a:t> binding:</a:t>
+            </a:r>
+          </a:p>
+          <a:p>
+            <a:pPr marL="0" marR="0" lvl="0" indent="0" algn="l" defTabSz="914400" rtl="0" eaLnBrk="1" fontAlgn="auto" latinLnBrk="0" hangingPunct="1">
+              <a:lnSpc>
+                <a:spcPct val="100000"/>
+              </a:lnSpc>
+              <a:spcBef>
+                <a:spcPts val="0"/>
+              </a:spcBef>
+              <a:spcAft>
+                <a:spcPts val="0"/>
+              </a:spcAft>
+              <a:buClrTx/>
+              <a:buSzTx/>
+              <a:buFontTx/>
+              <a:buNone/>
+              <a:tabLst/>
+              <a:defRPr/>
+            </a:pPr>
+            <a:r>
+              <a:rPr lang="en-US" i="0" dirty="0"/>
+              <a:t>https://localhost:7248/binding/guid/AAAAAAAA-D7B4-47ED-A9E7-AE18721D6F3D</a:t>
+            </a:r>
+          </a:p>
+          <a:p>
+            <a:pPr marL="0" marR="0" lvl="0" indent="0" algn="l" defTabSz="914400" rtl="0" eaLnBrk="1" fontAlgn="auto" latinLnBrk="0" hangingPunct="1">
+              <a:lnSpc>
+                <a:spcPct val="100000"/>
+              </a:lnSpc>
+              <a:spcBef>
+                <a:spcPts val="0"/>
+              </a:spcBef>
+              <a:spcAft>
+                <a:spcPts val="0"/>
+              </a:spcAft>
+              <a:buClrTx/>
+              <a:buSzTx/>
+              <a:buFontTx/>
+              <a:buNone/>
+              <a:tabLst/>
+              <a:defRPr/>
+            </a:pPr>
+            <a:endParaRPr lang="en-US" dirty="0"/>
+          </a:p>
+          <a:p>
+            <a:pPr marL="0" marR="0" lvl="0" indent="0" algn="l" defTabSz="914400" rtl="0" eaLnBrk="1" fontAlgn="auto" latinLnBrk="0" hangingPunct="1">
+              <a:lnSpc>
+                <a:spcPct val="100000"/>
+              </a:lnSpc>
+              <a:spcBef>
+                <a:spcPts val="0"/>
+              </a:spcBef>
+              <a:spcAft>
+                <a:spcPts val="0"/>
+              </a:spcAft>
+              <a:buClrTx/>
+              <a:buSzTx/>
+              <a:buFontTx/>
+              <a:buNone/>
+              <a:tabLst/>
+              <a:defRPr/>
+            </a:pPr>
+            <a:r>
+              <a:rPr lang="en-US" dirty="0" err="1"/>
+              <a:t>ArticleNumber</a:t>
+            </a:r>
+            <a:r>
+              <a:rPr lang="en-US" dirty="0"/>
+              <a:t> binding:</a:t>
+            </a:r>
+          </a:p>
+          <a:p>
+            <a:pPr marL="0" marR="0" lvl="0" indent="0" algn="l" defTabSz="914400" rtl="0" eaLnBrk="1" fontAlgn="auto" latinLnBrk="0" hangingPunct="1">
+              <a:lnSpc>
+                <a:spcPct val="100000"/>
+              </a:lnSpc>
+              <a:spcBef>
+                <a:spcPts val="0"/>
+              </a:spcBef>
+              <a:spcAft>
+                <a:spcPts val="0"/>
+              </a:spcAft>
+              <a:buClrTx/>
+              <a:buSzTx/>
+              <a:buFontTx/>
+              <a:buNone/>
+              <a:tabLst/>
+              <a:defRPr/>
+            </a:pPr>
+            <a:r>
+              <a:rPr lang="en-US" i="0" dirty="0"/>
+              <a:t>https://localhost:7248/binding/articleNumber/typeConverter/123456789</a:t>
+            </a:r>
+            <a:endParaRPr lang="en-US" dirty="0"/>
           </a:p>
         </p:txBody>
       </p:sp>
@@ -2652,6 +3140,134 @@
               <a:rPr lang="en-US" dirty="0" err="1"/>
               <a:t>debuggen</a:t>
             </a:r>
+            <a:endParaRPr lang="en-US" i="0" dirty="0"/>
+          </a:p>
+          <a:p>
+            <a:pPr marL="0" marR="0" lvl="0" indent="0" algn="l" defTabSz="914400" rtl="0" eaLnBrk="1" fontAlgn="auto" latinLnBrk="0" hangingPunct="1">
+              <a:lnSpc>
+                <a:spcPct val="100000"/>
+              </a:lnSpc>
+              <a:spcBef>
+                <a:spcPts val="0"/>
+              </a:spcBef>
+              <a:spcAft>
+                <a:spcPts val="0"/>
+              </a:spcAft>
+              <a:buClrTx/>
+              <a:buSzTx/>
+              <a:buFontTx/>
+              <a:buNone/>
+              <a:tabLst/>
+              <a:defRPr/>
+            </a:pPr>
+            <a:r>
+              <a:rPr lang="en-US" i="0" dirty="0">
+                <a:sym typeface="Wingdings" panose="05000000000000000000" pitchFamily="2" charset="2"/>
+              </a:rPr>
+              <a:t> </a:t>
+            </a:r>
+            <a:r>
+              <a:rPr lang="en-US" i="0" dirty="0" err="1">
+                <a:sym typeface="Wingdings" panose="05000000000000000000" pitchFamily="2" charset="2"/>
+              </a:rPr>
+              <a:t>StackTrace</a:t>
+            </a:r>
+            <a:r>
+              <a:rPr lang="en-US" i="0" dirty="0">
+                <a:sym typeface="Wingdings" panose="05000000000000000000" pitchFamily="2" charset="2"/>
+              </a:rPr>
+              <a:t> </a:t>
+            </a:r>
+            <a:r>
+              <a:rPr lang="en-US" i="0" dirty="0" err="1">
+                <a:sym typeface="Wingdings" panose="05000000000000000000" pitchFamily="2" charset="2"/>
+              </a:rPr>
+              <a:t>zeigen</a:t>
+            </a:r>
+            <a:endParaRPr lang="en-US" dirty="0"/>
+          </a:p>
+          <a:p>
+            <a:pPr marL="0" indent="0">
+              <a:buFont typeface="Arial" panose="020B0604020202020204" pitchFamily="34" charset="0"/>
+              <a:buNone/>
+            </a:pPr>
+            <a:endParaRPr lang="en-US" dirty="0"/>
+          </a:p>
+          <a:p>
+            <a:pPr marL="0" marR="0" lvl="0" indent="0" algn="l" defTabSz="914400" rtl="0" eaLnBrk="1" fontAlgn="auto" latinLnBrk="0" hangingPunct="1">
+              <a:lnSpc>
+                <a:spcPct val="100000"/>
+              </a:lnSpc>
+              <a:spcBef>
+                <a:spcPts val="0"/>
+              </a:spcBef>
+              <a:spcAft>
+                <a:spcPts val="0"/>
+              </a:spcAft>
+              <a:buClrTx/>
+              <a:buSzTx/>
+              <a:buFontTx/>
+              <a:buNone/>
+              <a:tabLst/>
+              <a:defRPr/>
+            </a:pPr>
+            <a:endParaRPr lang="en-US" dirty="0"/>
+          </a:p>
+          <a:p>
+            <a:pPr marL="0" marR="0" lvl="0" indent="0" algn="l" defTabSz="914400" rtl="0" eaLnBrk="1" fontAlgn="auto" latinLnBrk="0" hangingPunct="1">
+              <a:lnSpc>
+                <a:spcPct val="100000"/>
+              </a:lnSpc>
+              <a:spcBef>
+                <a:spcPts val="0"/>
+              </a:spcBef>
+              <a:spcAft>
+                <a:spcPts val="0"/>
+              </a:spcAft>
+              <a:buClrTx/>
+              <a:buSzTx/>
+              <a:buFontTx/>
+              <a:buNone/>
+              <a:tabLst/>
+              <a:defRPr/>
+            </a:pPr>
+            <a:r>
+              <a:rPr lang="en-US" dirty="0" err="1"/>
+              <a:t>ArticleNumber</a:t>
+            </a:r>
+            <a:r>
+              <a:rPr lang="en-US" dirty="0"/>
+              <a:t> binding:</a:t>
+            </a:r>
+          </a:p>
+          <a:p>
+            <a:pPr marL="0" marR="0" lvl="0" indent="0" algn="l" defTabSz="914400" rtl="0" eaLnBrk="1" fontAlgn="auto" latinLnBrk="0" hangingPunct="1">
+              <a:lnSpc>
+                <a:spcPct val="100000"/>
+              </a:lnSpc>
+              <a:spcBef>
+                <a:spcPts val="0"/>
+              </a:spcBef>
+              <a:spcAft>
+                <a:spcPts val="0"/>
+              </a:spcAft>
+              <a:buClrTx/>
+              <a:buSzTx/>
+              <a:buFontTx/>
+              <a:buNone/>
+              <a:tabLst/>
+              <a:defRPr/>
+            </a:pPr>
+            <a:r>
+              <a:rPr lang="en-US" i="0" dirty="0"/>
+              <a:t>https://localhost:7248/binding/articleNumber/modelBinder/123456789</a:t>
+            </a:r>
+          </a:p>
+          <a:p>
+            <a:pPr marL="0" indent="0">
+              <a:buFont typeface="Arial" panose="020B0604020202020204" pitchFamily="34" charset="0"/>
+              <a:buNone/>
+            </a:pPr>
             <a:endParaRPr lang="en-AT" dirty="0"/>
           </a:p>
         </p:txBody>
@@ -8597,7 +9213,7 @@
             </a:r>
             <a:r>
               <a:rPr lang="en-US" sz="1400" dirty="0">
-                <a:hlinkClick r:id="rId2"/>
+                <a:hlinkClick r:id="rId3"/>
               </a:rPr>
               <a:t>https://github.com/dotnet/aspnetcore</a:t>
             </a:r>
@@ -8607,27 +9223,6 @@
             <a:r>
               <a:rPr lang="en-US" sz="1400" dirty="0" err="1"/>
               <a:t>SimpleTypeModelBinder</a:t>
-            </a:r>
-            <a:r>
-              <a:rPr lang="en-US" sz="1400" dirty="0"/>
-              <a:t>: </a:t>
-            </a:r>
-            <a:r>
-              <a:rPr lang="en-US" sz="1400" dirty="0">
-                <a:hlinkClick r:id="rId3"/>
-              </a:rPr>
-              <a:t>https://github.com/dotnet/aspnetcore/blob/main/src/Mvc/Mvc.Core/src/ModelBinding/Binders/SimpleTypeModelBinder.cs</a:t>
-            </a:r>
-            <a:endParaRPr lang="en-US" sz="1400" dirty="0"/>
-          </a:p>
-          <a:p>
-            <a:r>
-              <a:rPr lang="en-US" sz="1400" dirty="0"/>
-              <a:t>Implementing </a:t>
-            </a:r>
-            <a:r>
-              <a:rPr lang="en-US" sz="1400" dirty="0" err="1"/>
-              <a:t>ModelBinderProvider</a:t>
             </a:r>
             <a:r>
               <a:rPr lang="en-US" sz="1400" dirty="0"/>
@@ -8637,17 +9232,18 @@
               <a:rPr lang="en-US" sz="1400" dirty="0">
                 <a:hlinkClick r:id="rId4"/>
               </a:rPr>
-              <a:t>https://docs.microsoft.com/en-us/aspnet/core/mvc/advanced/custom-model-binding?view=aspnetcore-6.0#implementing-a-modelbinderprovider</a:t>
-            </a:r>
+              <a:t>https://github.com/dotnet/aspnetcore/blob/main/src/Mvc/Mvc.Core/src/ModelBinding/Binders/SimpleTypeModelBinder.cs</a:t>
+            </a:r>
+            <a:endParaRPr lang="en-US" sz="1400" dirty="0"/>
+          </a:p>
+          <a:p>
             <a:r>
               <a:rPr lang="en-US" sz="1400" dirty="0"/>
-              <a:t> </a:t>
-            </a:r>
-          </a:p>
-          <a:p>
+              <a:t>Implementing </a:t>
+            </a:r>
             <a:r>
               <a:rPr lang="en-US" sz="1400" dirty="0" err="1"/>
-              <a:t>TypeConverter</a:t>
+              <a:t>ModelBinderProvider</a:t>
             </a:r>
             <a:r>
               <a:rPr lang="en-US" sz="1400" dirty="0"/>
@@ -8657,14 +9253,17 @@
               <a:rPr lang="en-US" sz="1400" dirty="0">
                 <a:hlinkClick r:id="rId5"/>
               </a:rPr>
-              <a:t>https://docs.microsoft.com/en-us/dotnet/api/system.componentmodel.typeconverter</a:t>
-            </a:r>
-            <a:endParaRPr lang="en-US" sz="1400" dirty="0"/>
+              <a:t>https://docs.microsoft.com/en-us/aspnet/core/mvc/advanced/custom-model-binding?view=aspnetcore-6.0#implementing-a-modelbinderprovider</a:t>
+            </a:r>
+            <a:r>
+              <a:rPr lang="en-US" sz="1400" dirty="0"/>
+              <a:t> </a:t>
+            </a:r>
           </a:p>
           <a:p>
             <a:r>
               <a:rPr lang="en-US" sz="1400" dirty="0" err="1"/>
-              <a:t>TypeDescriptor</a:t>
+              <a:t>TypeConverter</a:t>
             </a:r>
             <a:r>
               <a:rPr lang="en-US" sz="1400" dirty="0"/>
@@ -8674,36 +9273,53 @@
               <a:rPr lang="en-US" sz="1400" dirty="0">
                 <a:hlinkClick r:id="rId6"/>
               </a:rPr>
-              <a:t>https://docs.microsoft.com/en-us/dotnet/api/system.componentmodel.typedescriptor</a:t>
+              <a:t>https://docs.microsoft.com/en-us/dotnet/api/system.componentmodel.typeconverter</a:t>
             </a:r>
             <a:endParaRPr lang="en-US" sz="1400" dirty="0"/>
           </a:p>
           <a:p>
             <a:r>
               <a:rPr lang="en-US" sz="1400" dirty="0" err="1"/>
-              <a:t>GuidConverter</a:t>
+              <a:t>TypeDescriptor</a:t>
             </a:r>
             <a:r>
               <a:rPr lang="en-US" sz="1400" dirty="0"/>
-              <a:t> implementation from the dotnet runtime: </a:t>
+              <a:t>: </a:t>
             </a:r>
             <a:r>
               <a:rPr lang="en-US" sz="1400" dirty="0">
                 <a:hlinkClick r:id="rId7"/>
               </a:rPr>
-              <a:t>https://github.com/dotnet/runtime/blob/main/src/libraries/System.ComponentModel.TypeConverter/src/System/ComponentModel/GuidConverter.cs</a:t>
+              <a:t>https://docs.microsoft.com/en-us/dotnet/api/system.componentmodel.typedescriptor</a:t>
             </a:r>
             <a:endParaRPr lang="en-US" sz="1400" dirty="0"/>
           </a:p>
           <a:p>
             <a:r>
+              <a:rPr lang="en-US" sz="1400" dirty="0" err="1"/>
+              <a:t>GuidConverter</a:t>
+            </a:r>
+            <a:r>
               <a:rPr lang="en-US" sz="1400" dirty="0"/>
-              <a:t>Domain specific value types: </a:t>
+              <a:t> implementation from the dotnet runtime: </a:t>
             </a:r>
             <a:r>
               <a:rPr lang="en-US" sz="1400" dirty="0">
                 <a:hlinkClick r:id="rId8"/>
               </a:rPr>
+              <a:t>https://github.com/dotnet/runtime/blob/main/src/libraries/System.ComponentModel.TypeConverter/src/System/ComponentModel/GuidConverter.cs</a:t>
+            </a:r>
+            <a:endParaRPr lang="en-US" sz="1400" dirty="0"/>
+          </a:p>
+          <a:p>
+            <a:r>
+              <a:rPr lang="en-US" sz="1400" dirty="0"/>
+              <a:t>Domain specific value types: </a:t>
+            </a:r>
+            <a:r>
+              <a:rPr lang="en-US" sz="1400" dirty="0">
+                <a:hlinkClick r:id="rId9"/>
+              </a:rPr>
               <a:t>https://freecontent.manning.com/domain-primitives-what-they-are-and-how-you-can-use-them-to-make-more-secure-software/</a:t>
             </a:r>
             <a:endParaRPr lang="en-US" sz="1400" dirty="0"/>
@@ -8715,7 +9331,7 @@
             </a:r>
             <a:r>
               <a:rPr lang="en-US" sz="1400" dirty="0">
-                <a:hlinkClick r:id="rId9"/>
+                <a:hlinkClick r:id="rId10"/>
               </a:rPr>
               <a:t>https://fideloper.com/hexagonal-architecture</a:t>
             </a:r>
@@ -9522,10 +10138,10 @@
       </p:sp>
       <p:pic>
         <p:nvPicPr>
-          <p:cNvPr id="15" name="Grafik 14">
-            <a:extLst>
-              <a:ext uri="{FF2B5EF4-FFF2-40B4-BE49-F238E27FC236}">
-                <a16:creationId xmlns:a16="http://schemas.microsoft.com/office/drawing/2014/main" id="{530FAD2C-7A38-4F01-B34A-0957021E8F0D}"/>
+          <p:cNvPr id="5" name="Grafik 4">
+            <a:extLst>
+              <a:ext uri="{FF2B5EF4-FFF2-40B4-BE49-F238E27FC236}">
+                <a16:creationId xmlns:a16="http://schemas.microsoft.com/office/drawing/2014/main" id="{731E4938-DF47-45FA-BDA5-027F78C45603}"/>
               </a:ext>
             </a:extLst>
           </p:cNvPr>
@@ -9542,8 +10158,8 @@
         </p:blipFill>
         <p:spPr>
           <a:xfrm>
-            <a:off x="5529002" y="2925183"/>
-            <a:ext cx="6353695" cy="2608103"/>
+            <a:off x="5899112" y="1794307"/>
+            <a:ext cx="5701646" cy="4421298"/>
           </a:xfrm>
           <a:prstGeom prst="rect">
             <a:avLst/>
@@ -9790,7 +10406,7 @@
             <a:pPr lvl="1"/>
             <a:r>
               <a:rPr lang="en-US" dirty="0"/>
-              <a:t>Bind primitives</a:t>
+              <a:t>Bind primitives,</a:t>
             </a:r>
           </a:p>
           <a:p>
@@ -9975,19 +10591,19 @@
           <a:p>
             <a:r>
               <a:rPr lang="en-US" dirty="0"/>
-              <a:t>define a Converter for a Type</a:t>
+              <a:t>Define a Converter for a Type</a:t>
             </a:r>
           </a:p>
           <a:p>
             <a:r>
               <a:rPr lang="en-US" dirty="0"/>
-              <a:t>retrieve the Converter</a:t>
+              <a:t>Retrieve the Converter</a:t>
             </a:r>
           </a:p>
           <a:p>
             <a:r>
               <a:rPr lang="en-US" dirty="0"/>
-              <a:t>convert</a:t>
+              <a:t>Convert</a:t>
             </a:r>
           </a:p>
           <a:p>
@@ -10139,7 +10755,7 @@
           <a:p>
             <a:r>
               <a:rPr lang="en-US" dirty="0"/>
-              <a:t>utilized to bind </a:t>
+              <a:t>Utilized to bind </a:t>
             </a:r>
             <a:r>
               <a:rPr lang="en-US" dirty="0" err="1"/>
@@ -10150,7 +10766,7 @@
           <a:p>
             <a:r>
               <a:rPr lang="en-US" dirty="0"/>
-              <a:t>can be extended</a:t>
+              <a:t>Can be extended</a:t>
             </a:r>
             <a:endParaRPr lang="en-AT" dirty="0"/>
           </a:p>

</xml_diff>